<commit_message>
20190716 2ND DRAFT COMPLETE
</commit_message>
<xml_diff>
--- a/figures/chapter-renf/SCS-collection.pptx
+++ b/figures/chapter-renf/SCS-collection.pptx
@@ -261,7 +261,7 @@
           <a:p>
             <a:fld id="{BBF147C0-A057-4A43-960B-D74572CC8C08}" type="datetimeFigureOut">
               <a:rPr lang="en-GB" smtClean="0"/>
-              <a:t>25/03/2019</a:t>
+              <a:t>09/07/2019</a:t>
             </a:fld>
             <a:endParaRPr lang="en-GB"/>
           </a:p>
@@ -461,7 +461,7 @@
           <a:p>
             <a:fld id="{BBF147C0-A057-4A43-960B-D74572CC8C08}" type="datetimeFigureOut">
               <a:rPr lang="en-GB" smtClean="0"/>
-              <a:t>25/03/2019</a:t>
+              <a:t>09/07/2019</a:t>
             </a:fld>
             <a:endParaRPr lang="en-GB"/>
           </a:p>
@@ -671,7 +671,7 @@
           <a:p>
             <a:fld id="{BBF147C0-A057-4A43-960B-D74572CC8C08}" type="datetimeFigureOut">
               <a:rPr lang="en-GB" smtClean="0"/>
-              <a:t>25/03/2019</a:t>
+              <a:t>09/07/2019</a:t>
             </a:fld>
             <a:endParaRPr lang="en-GB"/>
           </a:p>
@@ -871,7 +871,7 @@
           <a:p>
             <a:fld id="{BBF147C0-A057-4A43-960B-D74572CC8C08}" type="datetimeFigureOut">
               <a:rPr lang="en-GB" smtClean="0"/>
-              <a:t>25/03/2019</a:t>
+              <a:t>09/07/2019</a:t>
             </a:fld>
             <a:endParaRPr lang="en-GB"/>
           </a:p>
@@ -1147,7 +1147,7 @@
           <a:p>
             <a:fld id="{BBF147C0-A057-4A43-960B-D74572CC8C08}" type="datetimeFigureOut">
               <a:rPr lang="en-GB" smtClean="0"/>
-              <a:t>25/03/2019</a:t>
+              <a:t>09/07/2019</a:t>
             </a:fld>
             <a:endParaRPr lang="en-GB"/>
           </a:p>
@@ -1415,7 +1415,7 @@
           <a:p>
             <a:fld id="{BBF147C0-A057-4A43-960B-D74572CC8C08}" type="datetimeFigureOut">
               <a:rPr lang="en-GB" smtClean="0"/>
-              <a:t>25/03/2019</a:t>
+              <a:t>09/07/2019</a:t>
             </a:fld>
             <a:endParaRPr lang="en-GB"/>
           </a:p>
@@ -1830,7 +1830,7 @@
           <a:p>
             <a:fld id="{BBF147C0-A057-4A43-960B-D74572CC8C08}" type="datetimeFigureOut">
               <a:rPr lang="en-GB" smtClean="0"/>
-              <a:t>25/03/2019</a:t>
+              <a:t>09/07/2019</a:t>
             </a:fld>
             <a:endParaRPr lang="en-GB"/>
           </a:p>
@@ -1972,7 +1972,7 @@
           <a:p>
             <a:fld id="{BBF147C0-A057-4A43-960B-D74572CC8C08}" type="datetimeFigureOut">
               <a:rPr lang="en-GB" smtClean="0"/>
-              <a:t>25/03/2019</a:t>
+              <a:t>09/07/2019</a:t>
             </a:fld>
             <a:endParaRPr lang="en-GB"/>
           </a:p>
@@ -2085,7 +2085,7 @@
           <a:p>
             <a:fld id="{BBF147C0-A057-4A43-960B-D74572CC8C08}" type="datetimeFigureOut">
               <a:rPr lang="en-GB" smtClean="0"/>
-              <a:t>25/03/2019</a:t>
+              <a:t>09/07/2019</a:t>
             </a:fld>
             <a:endParaRPr lang="en-GB"/>
           </a:p>
@@ -2398,7 +2398,7 @@
           <a:p>
             <a:fld id="{BBF147C0-A057-4A43-960B-D74572CC8C08}" type="datetimeFigureOut">
               <a:rPr lang="en-GB" smtClean="0"/>
-              <a:t>25/03/2019</a:t>
+              <a:t>09/07/2019</a:t>
             </a:fld>
             <a:endParaRPr lang="en-GB"/>
           </a:p>
@@ -2687,7 +2687,7 @@
           <a:p>
             <a:fld id="{BBF147C0-A057-4A43-960B-D74572CC8C08}" type="datetimeFigureOut">
               <a:rPr lang="en-GB" smtClean="0"/>
-              <a:t>25/03/2019</a:t>
+              <a:t>09/07/2019</a:t>
             </a:fld>
             <a:endParaRPr lang="en-GB"/>
           </a:p>
@@ -2930,7 +2930,7 @@
           <a:p>
             <a:fld id="{BBF147C0-A057-4A43-960B-D74572CC8C08}" type="datetimeFigureOut">
               <a:rPr lang="en-GB" smtClean="0"/>
-              <a:t>25/03/2019</a:t>
+              <a:t>09/07/2019</a:t>
             </a:fld>
             <a:endParaRPr lang="en-GB"/>
           </a:p>
@@ -3799,7 +3799,7 @@
         </p:nvSpPr>
         <p:spPr>
           <a:xfrm>
-            <a:off x="7359934" y="2764799"/>
+            <a:off x="7857314" y="2970572"/>
             <a:ext cx="3050130" cy="584775"/>
           </a:xfrm>
           <a:prstGeom prst="rect">

</xml_diff>